<commit_message>
started from the bottom and im still there
</commit_message>
<xml_diff>
--- a/Presentation1.pptx
+++ b/Presentation1.pptx
@@ -7,6 +7,8 @@
   <p:sldIdLst>
     <p:sldId id="256" r:id="rId2"/>
     <p:sldId id="257" r:id="rId3"/>
+    <p:sldId id="258" r:id="rId4"/>
+    <p:sldId id="259" r:id="rId5"/>
   </p:sldIdLst>
   <p:sldSz cx="12192000" cy="6858000"/>
   <p:notesSz cx="6858000" cy="9144000"/>
@@ -3745,6 +3747,14 @@
 <file path=ppt/slides/slide2.xml><?xml version="1.0" encoding="utf-8"?>
 <p:sld xmlns:a="http://schemas.openxmlformats.org/drawingml/2006/main" xmlns:r="http://schemas.openxmlformats.org/officeDocument/2006/relationships" xmlns:p="http://schemas.openxmlformats.org/presentationml/2006/main">
   <p:cSld>
+    <p:bg>
+      <p:bgPr>
+        <a:solidFill>
+          <a:schemeClr val="bg1"/>
+        </a:solidFill>
+        <a:effectLst/>
+      </p:bgPr>
+    </p:bg>
     <p:spTree>
       <p:nvGrpSpPr>
         <p:cNvPr id="1" name=""/>
@@ -3761,51 +3771,557 @@
       </p:grpSpPr>
       <p:sp>
         <p:nvSpPr>
-          <p:cNvPr id="2" name="Title 1">
-            <a:extLst>
-              <a:ext uri="{FF2B5EF4-FFF2-40B4-BE49-F238E27FC236}">
-                <a16:creationId xmlns:a16="http://schemas.microsoft.com/office/drawing/2014/main" id="{7499FE74-F4EB-4B48-9403-4FC0D9A1EFB1}"/>
-              </a:ext>
-            </a:extLst>
-          </p:cNvPr>
-          <p:cNvSpPr>
-            <a:spLocks noGrp="1"/>
-          </p:cNvSpPr>
-          <p:nvPr>
-            <p:ph type="title"/>
-          </p:nvPr>
-        </p:nvSpPr>
-        <p:spPr/>
-        <p:txBody>
-          <a:bodyPr/>
-          <a:lstStyle/>
-          <a:p>
-            <a:endParaRPr lang="en-DK"/>
-          </a:p>
-        </p:txBody>
-      </p:sp>
-      <p:sp>
-        <p:nvSpPr>
-          <p:cNvPr id="3" name="Content Placeholder 2">
-            <a:extLst>
-              <a:ext uri="{FF2B5EF4-FFF2-40B4-BE49-F238E27FC236}">
-                <a16:creationId xmlns:a16="http://schemas.microsoft.com/office/drawing/2014/main" id="{68FEFAE1-2778-D666-B031-468377A3F962}"/>
-              </a:ext>
-            </a:extLst>
-          </p:cNvPr>
-          <p:cNvSpPr>
-            <a:spLocks noGrp="1"/>
-          </p:cNvSpPr>
+          <p:cNvPr id="36" name="Rectangle 21">
+            <a:extLst>
+              <a:ext uri="{FF2B5EF4-FFF2-40B4-BE49-F238E27FC236}">
+                <a16:creationId xmlns:a16="http://schemas.microsoft.com/office/drawing/2014/main" id="{86FF76B9-219D-4469-AF87-0236D29032F1}"/>
+              </a:ext>
+              <a:ext uri="{C183D7F6-B498-43B3-948B-1728B52AA6E4}">
+                <adec:decorative xmlns:adec="http://schemas.microsoft.com/office/drawing/2017/decorative" val="1"/>
+              </a:ext>
+            </a:extLst>
+          </p:cNvPr>
+          <p:cNvSpPr>
+            <a:spLocks noGrp="1" noRot="1" noChangeAspect="1" noMove="1" noResize="1" noEditPoints="1" noAdjustHandles="1" noChangeArrowheads="1" noChangeShapeType="1" noTextEdit="1"/>
+          </p:cNvSpPr>
+          <p:nvPr>
+            <p:extLst>
+              <p:ext uri="{386F3935-93C4-4BCD-93E2-E3B085C9AB24}">
+                <p16:designElem xmlns:p16="http://schemas.microsoft.com/office/powerpoint/2015/main" val="1"/>
+              </p:ext>
+            </p:extLst>
+          </p:nvPr>
+        </p:nvSpPr>
+        <p:spPr>
+          <a:xfrm>
+            <a:off x="0" y="0"/>
+            <a:ext cx="12192000" cy="6858000"/>
+          </a:xfrm>
+          <a:prstGeom prst="rect">
+            <a:avLst/>
+          </a:prstGeom>
+          <a:solidFill>
+            <a:schemeClr val="bg1"/>
+          </a:solidFill>
+          <a:ln>
+            <a:noFill/>
+          </a:ln>
+        </p:spPr>
+        <p:style>
+          <a:lnRef idx="2">
+            <a:schemeClr val="accent1">
+              <a:shade val="50000"/>
+            </a:schemeClr>
+          </a:lnRef>
+          <a:fillRef idx="1">
+            <a:schemeClr val="accent1"/>
+          </a:fillRef>
+          <a:effectRef idx="0">
+            <a:schemeClr val="accent1"/>
+          </a:effectRef>
+          <a:fontRef idx="minor">
+            <a:schemeClr val="lt1"/>
+          </a:fontRef>
+        </p:style>
+        <p:txBody>
+          <a:bodyPr rtlCol="0" anchor="ctr"/>
+          <a:lstStyle/>
+          <a:p>
+            <a:pPr algn="ctr"/>
+            <a:endParaRPr lang="en-US" dirty="0"/>
+          </a:p>
+        </p:txBody>
+      </p:sp>
+      <p:grpSp>
+        <p:nvGrpSpPr>
+          <p:cNvPr id="37" name="Group 23">
+            <a:extLst>
+              <a:ext uri="{FF2B5EF4-FFF2-40B4-BE49-F238E27FC236}">
+                <a16:creationId xmlns:a16="http://schemas.microsoft.com/office/drawing/2014/main" id="{DB88BD78-87E1-424D-B479-C37D8E41B12E}"/>
+              </a:ext>
+              <a:ext uri="{C183D7F6-B498-43B3-948B-1728B52AA6E4}">
+                <adec:decorative xmlns:adec="http://schemas.microsoft.com/office/drawing/2017/decorative" val="1"/>
+              </a:ext>
+            </a:extLst>
+          </p:cNvPr>
+          <p:cNvGrpSpPr>
+            <a:grpSpLocks noGrp="1" noUngrp="1" noRot="1" noChangeAspect="1" noMove="1" noResize="1"/>
+          </p:cNvGrpSpPr>
+          <p:nvPr>
+            <p:extLst>
+              <p:ext uri="{386F3935-93C4-4BCD-93E2-E3B085C9AB24}">
+                <p16:designElem xmlns:p16="http://schemas.microsoft.com/office/powerpoint/2015/main" val="1"/>
+              </p:ext>
+            </p:extLst>
+          </p:nvPr>
+        </p:nvGrpSpPr>
+        <p:grpSpPr>
+          <a:xfrm flipH="1">
+            <a:off x="10964637" y="2358"/>
+            <a:ext cx="1876653" cy="1766008"/>
+            <a:chOff x="-648769" y="2358"/>
+            <a:chExt cx="1876653" cy="1766008"/>
+          </a:xfrm>
+        </p:grpSpPr>
+        <p:sp>
+          <p:nvSpPr>
+            <p:cNvPr id="25" name="Freeform: Shape 24">
+              <a:extLst>
+                <a:ext uri="{FF2B5EF4-FFF2-40B4-BE49-F238E27FC236}">
+                  <a16:creationId xmlns:a16="http://schemas.microsoft.com/office/drawing/2014/main" id="{C05EB894-9410-4B20-95E4-7A25101AB895}"/>
+                </a:ext>
+                <a:ext uri="{C183D7F6-B498-43B3-948B-1728B52AA6E4}">
+                  <adec:decorative xmlns:adec="http://schemas.microsoft.com/office/drawing/2017/decorative" val="1"/>
+                </a:ext>
+              </a:extLst>
+            </p:cNvPr>
+            <p:cNvSpPr/>
+            <p:nvPr>
+              <p:extLst>
+                <p:ext uri="{386F3935-93C4-4BCD-93E2-E3B085C9AB24}">
+                  <p16:designElem xmlns:p16="http://schemas.microsoft.com/office/powerpoint/2015/main" val="1"/>
+                </p:ext>
+              </p:extLst>
+            </p:nvPr>
+          </p:nvSpPr>
+          <p:spPr>
+            <a:xfrm rot="2700000">
+              <a:off x="-415188" y="-231223"/>
+              <a:ext cx="1409491" cy="1876653"/>
+            </a:xfrm>
+            <a:custGeom>
+              <a:avLst/>
+              <a:gdLst>
+                <a:gd name="connsiteX0" fmla="*/ 0 w 1409491"/>
+                <a:gd name="connsiteY0" fmla="*/ 643075 h 1876653"/>
+                <a:gd name="connsiteX1" fmla="*/ 643075 w 1409491"/>
+                <a:gd name="connsiteY1" fmla="*/ 0 h 1876653"/>
+                <a:gd name="connsiteX2" fmla="*/ 1409491 w 1409491"/>
+                <a:gd name="connsiteY2" fmla="*/ 0 h 1876653"/>
+                <a:gd name="connsiteX3" fmla="*/ 1409491 w 1409491"/>
+                <a:gd name="connsiteY3" fmla="*/ 1876653 h 1876653"/>
+                <a:gd name="connsiteX4" fmla="*/ 1233578 w 1409491"/>
+                <a:gd name="connsiteY4" fmla="*/ 1876653 h 1876653"/>
+              </a:gdLst>
+              <a:ahLst/>
+              <a:cxnLst>
+                <a:cxn ang="0">
+                  <a:pos x="connsiteX0" y="connsiteY0"/>
+                </a:cxn>
+                <a:cxn ang="0">
+                  <a:pos x="connsiteX1" y="connsiteY1"/>
+                </a:cxn>
+                <a:cxn ang="0">
+                  <a:pos x="connsiteX2" y="connsiteY2"/>
+                </a:cxn>
+                <a:cxn ang="0">
+                  <a:pos x="connsiteX3" y="connsiteY3"/>
+                </a:cxn>
+                <a:cxn ang="0">
+                  <a:pos x="connsiteX4" y="connsiteY4"/>
+                </a:cxn>
+              </a:cxnLst>
+              <a:rect l="l" t="t" r="r" b="b"/>
+              <a:pathLst>
+                <a:path w="1409491" h="1876653">
+                  <a:moveTo>
+                    <a:pt x="0" y="643075"/>
+                  </a:moveTo>
+                  <a:lnTo>
+                    <a:pt x="643075" y="0"/>
+                  </a:lnTo>
+                  <a:lnTo>
+                    <a:pt x="1409491" y="0"/>
+                  </a:lnTo>
+                  <a:lnTo>
+                    <a:pt x="1409491" y="1876653"/>
+                  </a:lnTo>
+                  <a:lnTo>
+                    <a:pt x="1233578" y="1876653"/>
+                  </a:lnTo>
+                  <a:close/>
+                </a:path>
+              </a:pathLst>
+            </a:custGeom>
+            <a:solidFill>
+              <a:schemeClr val="accent1">
+                <a:alpha val="30000"/>
+              </a:schemeClr>
+            </a:solidFill>
+            <a:ln>
+              <a:noFill/>
+            </a:ln>
+          </p:spPr>
+          <p:style>
+            <a:lnRef idx="2">
+              <a:schemeClr val="accent1">
+                <a:shade val="50000"/>
+              </a:schemeClr>
+            </a:lnRef>
+            <a:fillRef idx="1">
+              <a:schemeClr val="accent1"/>
+            </a:fillRef>
+            <a:effectRef idx="0">
+              <a:schemeClr val="accent1"/>
+            </a:effectRef>
+            <a:fontRef idx="minor">
+              <a:schemeClr val="lt1"/>
+            </a:fontRef>
+          </p:style>
+          <p:txBody>
+            <a:bodyPr rtlCol="0" anchor="ctr"/>
+            <a:lstStyle/>
+            <a:p>
+              <a:pPr algn="ctr"/>
+              <a:endParaRPr lang="en-US"/>
+            </a:p>
+          </p:txBody>
+        </p:sp>
+        <p:sp>
+          <p:nvSpPr>
+            <p:cNvPr id="38" name="Rectangle 25">
+              <a:extLst>
+                <a:ext uri="{FF2B5EF4-FFF2-40B4-BE49-F238E27FC236}">
+                  <a16:creationId xmlns:a16="http://schemas.microsoft.com/office/drawing/2014/main" id="{166E38B6-B050-4340-8E8F-3A971DADC031}"/>
+                </a:ext>
+                <a:ext uri="{C183D7F6-B498-43B3-948B-1728B52AA6E4}">
+                  <adec:decorative xmlns:adec="http://schemas.microsoft.com/office/drawing/2017/decorative" val="1"/>
+                </a:ext>
+              </a:extLst>
+            </p:cNvPr>
+            <p:cNvSpPr/>
+            <p:nvPr>
+              <p:extLst>
+                <p:ext uri="{386F3935-93C4-4BCD-93E2-E3B085C9AB24}">
+                  <p16:designElem xmlns:p16="http://schemas.microsoft.com/office/powerpoint/2015/main" val="1"/>
+                </p:ext>
+              </p:extLst>
+            </p:nvPr>
+          </p:nvSpPr>
+          <p:spPr>
+            <a:xfrm rot="2700000">
+              <a:off x="301285" y="1282788"/>
+              <a:ext cx="485578" cy="485578"/>
+            </a:xfrm>
+            <a:prstGeom prst="rect">
+              <a:avLst/>
+            </a:prstGeom>
+            <a:solidFill>
+              <a:schemeClr val="accent1">
+                <a:alpha val="30000"/>
+              </a:schemeClr>
+            </a:solidFill>
+            <a:ln>
+              <a:noFill/>
+            </a:ln>
+          </p:spPr>
+          <p:style>
+            <a:lnRef idx="2">
+              <a:schemeClr val="accent1">
+                <a:shade val="50000"/>
+              </a:schemeClr>
+            </a:lnRef>
+            <a:fillRef idx="1">
+              <a:schemeClr val="accent1"/>
+            </a:fillRef>
+            <a:effectRef idx="0">
+              <a:schemeClr val="accent1"/>
+            </a:effectRef>
+            <a:fontRef idx="minor">
+              <a:schemeClr val="lt1"/>
+            </a:fontRef>
+          </p:style>
+          <p:txBody>
+            <a:bodyPr rtlCol="0" anchor="ctr"/>
+            <a:lstStyle/>
+            <a:p>
+              <a:pPr algn="ctr"/>
+              <a:endParaRPr lang="en-US"/>
+            </a:p>
+          </p:txBody>
+        </p:sp>
+      </p:grpSp>
+      <p:sp>
+        <p:nvSpPr>
+          <p:cNvPr id="39" name="Rectangle 27">
+            <a:extLst>
+              <a:ext uri="{FF2B5EF4-FFF2-40B4-BE49-F238E27FC236}">
+                <a16:creationId xmlns:a16="http://schemas.microsoft.com/office/drawing/2014/main" id="{2E80C965-DB6D-4F81-9E9E-B027384D0BD6}"/>
+              </a:ext>
+              <a:ext uri="{C183D7F6-B498-43B3-948B-1728B52AA6E4}">
+                <adec:decorative xmlns:adec="http://schemas.microsoft.com/office/drawing/2017/decorative" val="1"/>
+              </a:ext>
+            </a:extLst>
+          </p:cNvPr>
+          <p:cNvSpPr>
+            <a:spLocks noGrp="1" noRot="1" noChangeAspect="1" noMove="1" noResize="1" noEditPoints="1" noAdjustHandles="1" noChangeArrowheads="1" noChangeShapeType="1" noTextEdit="1"/>
+          </p:cNvSpPr>
+          <p:nvPr>
+            <p:extLst>
+              <p:ext uri="{386F3935-93C4-4BCD-93E2-E3B085C9AB24}">
+                <p16:designElem xmlns:p16="http://schemas.microsoft.com/office/powerpoint/2015/main" val="1"/>
+              </p:ext>
+            </p:extLst>
+          </p:nvPr>
+        </p:nvSpPr>
+        <p:spPr>
+          <a:xfrm rot="2700000">
+            <a:off x="2737196" y="6033666"/>
+            <a:ext cx="645368" cy="645368"/>
+          </a:xfrm>
+          <a:prstGeom prst="rect">
+            <a:avLst/>
+          </a:prstGeom>
+          <a:solidFill>
+            <a:schemeClr val="accent4">
+              <a:alpha val="30000"/>
+            </a:schemeClr>
+          </a:solidFill>
+          <a:ln>
+            <a:noFill/>
+          </a:ln>
+        </p:spPr>
+        <p:style>
+          <a:lnRef idx="2">
+            <a:schemeClr val="accent1">
+              <a:shade val="50000"/>
+            </a:schemeClr>
+          </a:lnRef>
+          <a:fillRef idx="1">
+            <a:schemeClr val="accent1"/>
+          </a:fillRef>
+          <a:effectRef idx="0">
+            <a:schemeClr val="accent1"/>
+          </a:effectRef>
+          <a:fontRef idx="minor">
+            <a:schemeClr val="lt1"/>
+          </a:fontRef>
+        </p:style>
+        <p:txBody>
+          <a:bodyPr rtlCol="0" anchor="ctr"/>
+          <a:lstStyle/>
+          <a:p>
+            <a:pPr algn="ctr"/>
+            <a:endParaRPr lang="en-US"/>
+          </a:p>
+        </p:txBody>
+      </p:sp>
+      <p:sp>
+        <p:nvSpPr>
+          <p:cNvPr id="40" name="Isosceles Triangle 29">
+            <a:extLst>
+              <a:ext uri="{FF2B5EF4-FFF2-40B4-BE49-F238E27FC236}">
+                <a16:creationId xmlns:a16="http://schemas.microsoft.com/office/drawing/2014/main" id="{633C5E46-DAC5-4661-9C87-22B08E2A512F}"/>
+              </a:ext>
+              <a:ext uri="{C183D7F6-B498-43B3-948B-1728B52AA6E4}">
+                <adec:decorative xmlns:adec="http://schemas.microsoft.com/office/drawing/2017/decorative" val="1"/>
+              </a:ext>
+            </a:extLst>
+          </p:cNvPr>
+          <p:cNvSpPr>
+            <a:spLocks noGrp="1" noRot="1" noChangeAspect="1" noMove="1" noResize="1" noEditPoints="1" noAdjustHandles="1" noChangeArrowheads="1" noChangeShapeType="1" noTextEdit="1"/>
+          </p:cNvSpPr>
+          <p:nvPr>
+            <p:extLst>
+              <p:ext uri="{386F3935-93C4-4BCD-93E2-E3B085C9AB24}">
+                <p16:designElem xmlns:p16="http://schemas.microsoft.com/office/powerpoint/2015/main" val="1"/>
+              </p:ext>
+            </p:extLst>
+          </p:nvPr>
+        </p:nvSpPr>
+        <p:spPr>
+          <a:xfrm>
+            <a:off x="1343436" y="5721108"/>
+            <a:ext cx="2261965" cy="1136891"/>
+          </a:xfrm>
+          <a:prstGeom prst="triangle">
+            <a:avLst>
+              <a:gd name="adj" fmla="val 50000"/>
+            </a:avLst>
+          </a:prstGeom>
+          <a:solidFill>
+            <a:schemeClr val="accent4">
+              <a:alpha val="30000"/>
+            </a:schemeClr>
+          </a:solidFill>
+          <a:ln>
+            <a:noFill/>
+          </a:ln>
+        </p:spPr>
+        <p:style>
+          <a:lnRef idx="2">
+            <a:schemeClr val="accent1">
+              <a:shade val="50000"/>
+            </a:schemeClr>
+          </a:lnRef>
+          <a:fillRef idx="1">
+            <a:schemeClr val="accent1"/>
+          </a:fillRef>
+          <a:effectRef idx="0">
+            <a:schemeClr val="accent1"/>
+          </a:effectRef>
+          <a:fontRef idx="minor">
+            <a:schemeClr val="lt1"/>
+          </a:fontRef>
+        </p:style>
+        <p:txBody>
+          <a:bodyPr rtlCol="0" anchor="ctr"/>
+          <a:lstStyle/>
+          <a:p>
+            <a:pPr algn="ctr"/>
+            <a:endParaRPr lang="en-US"/>
+          </a:p>
+        </p:txBody>
+      </p:sp>
+      <p:pic>
+        <p:nvPicPr>
+          <p:cNvPr id="13" name="Content Placeholder 12" descr="A picture containing graphical user interface&#10;&#10;Description automatically generated">
+            <a:extLst>
+              <a:ext uri="{FF2B5EF4-FFF2-40B4-BE49-F238E27FC236}">
+                <a16:creationId xmlns:a16="http://schemas.microsoft.com/office/drawing/2014/main" id="{9D146DFB-0473-FB8B-DD8E-748FC87CA314}"/>
+              </a:ext>
+            </a:extLst>
+          </p:cNvPr>
+          <p:cNvPicPr>
+            <a:picLocks noGrp="1" noChangeAspect="1"/>
+          </p:cNvPicPr>
           <p:nvPr>
             <p:ph idx="1"/>
           </p:nvPr>
-        </p:nvSpPr>
-        <p:spPr/>
-        <p:txBody>
-          <a:bodyPr/>
-          <a:lstStyle/>
-          <a:p>
-            <a:endParaRPr lang="en-DK"/>
+        </p:nvPicPr>
+        <p:blipFill>
+          <a:blip r:embed="rId2"/>
+          <a:stretch>
+            <a:fillRect/>
+          </a:stretch>
+        </p:blipFill>
+        <p:spPr>
+          <a:xfrm>
+            <a:off x="1683384" y="0"/>
+            <a:ext cx="9057752" cy="6793315"/>
+          </a:xfrm>
+          <a:prstGeom prst="rect">
+            <a:avLst/>
+          </a:prstGeom>
+          <a:ln>
+            <a:noFill/>
+          </a:ln>
+        </p:spPr>
+      </p:pic>
+      <p:sp>
+        <p:nvSpPr>
+          <p:cNvPr id="18" name="TextBox 17">
+            <a:extLst>
+              <a:ext uri="{FF2B5EF4-FFF2-40B4-BE49-F238E27FC236}">
+                <a16:creationId xmlns:a16="http://schemas.microsoft.com/office/drawing/2014/main" id="{D42E9CF2-5E18-F9E2-4D1C-E21A8C343D6D}"/>
+              </a:ext>
+            </a:extLst>
+          </p:cNvPr>
+          <p:cNvSpPr txBox="1"/>
+          <p:nvPr/>
+        </p:nvSpPr>
+        <p:spPr>
+          <a:xfrm>
+            <a:off x="183368" y="1182221"/>
+            <a:ext cx="1572225" cy="369332"/>
+          </a:xfrm>
+          <a:prstGeom prst="rect">
+            <a:avLst/>
+          </a:prstGeom>
+          <a:noFill/>
+        </p:spPr>
+        <p:txBody>
+          <a:bodyPr wrap="none" rtlCol="0">
+            <a:spAutoFit/>
+          </a:bodyPr>
+          <a:lstStyle/>
+          <a:p>
+            <a:r>
+              <a:rPr lang="en-DK" dirty="0"/>
+              <a:t>Bond p-values:</a:t>
+            </a:r>
+          </a:p>
+        </p:txBody>
+      </p:sp>
+      <p:sp>
+        <p:nvSpPr>
+          <p:cNvPr id="19" name="TextBox 18">
+            <a:extLst>
+              <a:ext uri="{FF2B5EF4-FFF2-40B4-BE49-F238E27FC236}">
+                <a16:creationId xmlns:a16="http://schemas.microsoft.com/office/drawing/2014/main" id="{E3133238-0737-A64D-BCF5-A409AD66D014}"/>
+              </a:ext>
+            </a:extLst>
+          </p:cNvPr>
+          <p:cNvSpPr txBox="1"/>
+          <p:nvPr/>
+        </p:nvSpPr>
+        <p:spPr>
+          <a:xfrm>
+            <a:off x="232520" y="2989999"/>
+            <a:ext cx="1737079" cy="646331"/>
+          </a:xfrm>
+          <a:prstGeom prst="rect">
+            <a:avLst/>
+          </a:prstGeom>
+          <a:noFill/>
+        </p:spPr>
+        <p:txBody>
+          <a:bodyPr wrap="none" rtlCol="0">
+            <a:spAutoFit/>
+          </a:bodyPr>
+          <a:lstStyle/>
+          <a:p>
+            <a:r>
+              <a:rPr lang="en-DK" dirty="0"/>
+              <a:t>Charge p-values:</a:t>
+            </a:r>
+          </a:p>
+          <a:p>
+            <a:r>
+              <a:rPr lang="en-DK" dirty="0"/>
+              <a:t>4 charges</a:t>
+            </a:r>
+          </a:p>
+        </p:txBody>
+      </p:sp>
+      <p:sp>
+        <p:nvSpPr>
+          <p:cNvPr id="20" name="TextBox 19">
+            <a:extLst>
+              <a:ext uri="{FF2B5EF4-FFF2-40B4-BE49-F238E27FC236}">
+                <a16:creationId xmlns:a16="http://schemas.microsoft.com/office/drawing/2014/main" id="{38406000-6749-94D3-42BC-E12003D19432}"/>
+              </a:ext>
+            </a:extLst>
+          </p:cNvPr>
+          <p:cNvSpPr txBox="1"/>
+          <p:nvPr/>
+        </p:nvSpPr>
+        <p:spPr>
+          <a:xfrm>
+            <a:off x="133733" y="5074776"/>
+            <a:ext cx="1737079" cy="646331"/>
+          </a:xfrm>
+          <a:prstGeom prst="rect">
+            <a:avLst/>
+          </a:prstGeom>
+          <a:noFill/>
+        </p:spPr>
+        <p:txBody>
+          <a:bodyPr wrap="none" rtlCol="0">
+            <a:spAutoFit/>
+          </a:bodyPr>
+          <a:lstStyle/>
+          <a:p>
+            <a:r>
+              <a:rPr lang="en-DK" dirty="0"/>
+              <a:t>Charge p-values:</a:t>
+            </a:r>
+          </a:p>
+          <a:p>
+            <a:r>
+              <a:rPr lang="en-DK" dirty="0"/>
+              <a:t>6 charges</a:t>
+            </a:r>
           </a:p>
         </p:txBody>
       </p:sp>
@@ -3813,6 +4329,930 @@
     <p:extLst>
       <p:ext uri="{BB962C8B-B14F-4D97-AF65-F5344CB8AC3E}">
         <p14:creationId xmlns:p14="http://schemas.microsoft.com/office/powerpoint/2010/main" val="3656656391"/>
+      </p:ext>
+    </p:extLst>
+  </p:cSld>
+  <p:clrMapOvr>
+    <a:masterClrMapping/>
+  </p:clrMapOvr>
+</p:sld>
+</file>
+
+<file path=ppt/slides/slide3.xml><?xml version="1.0" encoding="utf-8"?>
+<p:sld xmlns:a="http://schemas.openxmlformats.org/drawingml/2006/main" xmlns:r="http://schemas.openxmlformats.org/officeDocument/2006/relationships" xmlns:p="http://schemas.openxmlformats.org/presentationml/2006/main">
+  <p:cSld>
+    <p:bg>
+      <p:bgPr>
+        <a:solidFill>
+          <a:schemeClr val="bg1"/>
+        </a:solidFill>
+        <a:effectLst/>
+      </p:bgPr>
+    </p:bg>
+    <p:spTree>
+      <p:nvGrpSpPr>
+        <p:cNvPr id="1" name=""/>
+        <p:cNvGrpSpPr/>
+        <p:nvPr/>
+      </p:nvGrpSpPr>
+      <p:grpSpPr>
+        <a:xfrm>
+          <a:off x="0" y="0"/>
+          <a:ext cx="0" cy="0"/>
+          <a:chOff x="0" y="0"/>
+          <a:chExt cx="0" cy="0"/>
+        </a:xfrm>
+      </p:grpSpPr>
+      <p:sp>
+        <p:nvSpPr>
+          <p:cNvPr id="10" name="Rectangle 9">
+            <a:extLst>
+              <a:ext uri="{FF2B5EF4-FFF2-40B4-BE49-F238E27FC236}">
+                <a16:creationId xmlns:a16="http://schemas.microsoft.com/office/drawing/2014/main" id="{F3060C83-F051-4F0E-ABAD-AA0DFC48B218}"/>
+              </a:ext>
+              <a:ext uri="{C183D7F6-B498-43B3-948B-1728B52AA6E4}">
+                <adec:decorative xmlns:adec="http://schemas.microsoft.com/office/drawing/2017/decorative" val="1"/>
+              </a:ext>
+            </a:extLst>
+          </p:cNvPr>
+          <p:cNvSpPr>
+            <a:spLocks noGrp="1" noRot="1" noChangeAspect="1" noMove="1" noResize="1" noEditPoints="1" noAdjustHandles="1" noChangeArrowheads="1" noChangeShapeType="1" noTextEdit="1"/>
+          </p:cNvSpPr>
+          <p:nvPr>
+            <p:extLst>
+              <p:ext uri="{386F3935-93C4-4BCD-93E2-E3B085C9AB24}">
+                <p16:designElem xmlns:p16="http://schemas.microsoft.com/office/powerpoint/2015/main" val="1"/>
+              </p:ext>
+            </p:extLst>
+          </p:nvPr>
+        </p:nvSpPr>
+        <p:spPr>
+          <a:xfrm>
+            <a:off x="0" y="0"/>
+            <a:ext cx="12192000" cy="6858000"/>
+          </a:xfrm>
+          <a:prstGeom prst="rect">
+            <a:avLst/>
+          </a:prstGeom>
+          <a:solidFill>
+            <a:schemeClr val="bg1"/>
+          </a:solidFill>
+          <a:ln>
+            <a:noFill/>
+          </a:ln>
+        </p:spPr>
+        <p:style>
+          <a:lnRef idx="2">
+            <a:schemeClr val="accent1">
+              <a:shade val="50000"/>
+            </a:schemeClr>
+          </a:lnRef>
+          <a:fillRef idx="1">
+            <a:schemeClr val="accent1"/>
+          </a:fillRef>
+          <a:effectRef idx="0">
+            <a:schemeClr val="accent1"/>
+          </a:effectRef>
+          <a:fontRef idx="minor">
+            <a:schemeClr val="lt1"/>
+          </a:fontRef>
+        </p:style>
+        <p:txBody>
+          <a:bodyPr rtlCol="0" anchor="ctr"/>
+          <a:lstStyle/>
+          <a:p>
+            <a:pPr algn="ctr"/>
+            <a:endParaRPr lang="en-US" dirty="0"/>
+          </a:p>
+        </p:txBody>
+      </p:sp>
+      <p:sp>
+        <p:nvSpPr>
+          <p:cNvPr id="12" name="Freeform: Shape 11">
+            <a:extLst>
+              <a:ext uri="{FF2B5EF4-FFF2-40B4-BE49-F238E27FC236}">
+                <a16:creationId xmlns:a16="http://schemas.microsoft.com/office/drawing/2014/main" id="{83C98ABE-055B-441F-B07E-44F97F083C39}"/>
+              </a:ext>
+              <a:ext uri="{C183D7F6-B498-43B3-948B-1728B52AA6E4}">
+                <adec:decorative xmlns:adec="http://schemas.microsoft.com/office/drawing/2017/decorative" val="1"/>
+              </a:ext>
+            </a:extLst>
+          </p:cNvPr>
+          <p:cNvSpPr>
+            <a:spLocks noGrp="1" noRot="1" noChangeAspect="1" noMove="1" noResize="1" noEditPoints="1" noAdjustHandles="1" noChangeArrowheads="1" noChangeShapeType="1" noTextEdit="1"/>
+          </p:cNvSpPr>
+          <p:nvPr>
+            <p:extLst>
+              <p:ext uri="{386F3935-93C4-4BCD-93E2-E3B085C9AB24}">
+                <p16:designElem xmlns:p16="http://schemas.microsoft.com/office/powerpoint/2015/main" val="1"/>
+              </p:ext>
+            </p:extLst>
+          </p:nvPr>
+        </p:nvSpPr>
+        <p:spPr>
+          <a:xfrm rot="18900000" flipH="1">
+            <a:off x="-376156" y="-253670"/>
+            <a:ext cx="1827638" cy="1376989"/>
+          </a:xfrm>
+          <a:custGeom>
+            <a:avLst/>
+            <a:gdLst>
+              <a:gd name="connsiteX0" fmla="*/ 0 w 1827638"/>
+              <a:gd name="connsiteY0" fmla="*/ 987379 h 1376989"/>
+              <a:gd name="connsiteX1" fmla="*/ 987379 w 1827638"/>
+              <a:gd name="connsiteY1" fmla="*/ 0 h 1376989"/>
+              <a:gd name="connsiteX2" fmla="*/ 1827638 w 1827638"/>
+              <a:gd name="connsiteY2" fmla="*/ 840260 h 1376989"/>
+              <a:gd name="connsiteX3" fmla="*/ 1827638 w 1827638"/>
+              <a:gd name="connsiteY3" fmla="*/ 1376989 h 1376989"/>
+              <a:gd name="connsiteX4" fmla="*/ 0 w 1827638"/>
+              <a:gd name="connsiteY4" fmla="*/ 1376989 h 1376989"/>
+            </a:gdLst>
+            <a:ahLst/>
+            <a:cxnLst>
+              <a:cxn ang="0">
+                <a:pos x="connsiteX0" y="connsiteY0"/>
+              </a:cxn>
+              <a:cxn ang="0">
+                <a:pos x="connsiteX1" y="connsiteY1"/>
+              </a:cxn>
+              <a:cxn ang="0">
+                <a:pos x="connsiteX2" y="connsiteY2"/>
+              </a:cxn>
+              <a:cxn ang="0">
+                <a:pos x="connsiteX3" y="connsiteY3"/>
+              </a:cxn>
+              <a:cxn ang="0">
+                <a:pos x="connsiteX4" y="connsiteY4"/>
+              </a:cxn>
+            </a:cxnLst>
+            <a:rect l="l" t="t" r="r" b="b"/>
+            <a:pathLst>
+              <a:path w="1827638" h="1376989">
+                <a:moveTo>
+                  <a:pt x="0" y="987379"/>
+                </a:moveTo>
+                <a:lnTo>
+                  <a:pt x="987379" y="0"/>
+                </a:lnTo>
+                <a:lnTo>
+                  <a:pt x="1827638" y="840260"/>
+                </a:lnTo>
+                <a:lnTo>
+                  <a:pt x="1827638" y="1376989"/>
+                </a:lnTo>
+                <a:lnTo>
+                  <a:pt x="0" y="1376989"/>
+                </a:lnTo>
+                <a:close/>
+              </a:path>
+            </a:pathLst>
+          </a:custGeom>
+          <a:solidFill>
+            <a:schemeClr val="accent1">
+              <a:alpha val="30000"/>
+            </a:schemeClr>
+          </a:solidFill>
+          <a:ln>
+            <a:noFill/>
+          </a:ln>
+        </p:spPr>
+        <p:style>
+          <a:lnRef idx="2">
+            <a:schemeClr val="accent1">
+              <a:shade val="50000"/>
+            </a:schemeClr>
+          </a:lnRef>
+          <a:fillRef idx="1">
+            <a:schemeClr val="accent1"/>
+          </a:fillRef>
+          <a:effectRef idx="0">
+            <a:schemeClr val="accent1"/>
+          </a:effectRef>
+          <a:fontRef idx="minor">
+            <a:schemeClr val="lt1"/>
+          </a:fontRef>
+        </p:style>
+        <p:txBody>
+          <a:bodyPr rtlCol="0" anchor="ctr"/>
+          <a:lstStyle/>
+          <a:p>
+            <a:pPr algn="ctr"/>
+            <a:endParaRPr lang="en-US" dirty="0"/>
+          </a:p>
+        </p:txBody>
+      </p:sp>
+      <p:sp>
+        <p:nvSpPr>
+          <p:cNvPr id="14" name="Rectangle 13">
+            <a:extLst>
+              <a:ext uri="{FF2B5EF4-FFF2-40B4-BE49-F238E27FC236}">
+                <a16:creationId xmlns:a16="http://schemas.microsoft.com/office/drawing/2014/main" id="{29FDB030-9B49-4CED-8CCD-4D99382388AC}"/>
+              </a:ext>
+              <a:ext uri="{C183D7F6-B498-43B3-948B-1728B52AA6E4}">
+                <adec:decorative xmlns:adec="http://schemas.microsoft.com/office/drawing/2017/decorative" val="1"/>
+              </a:ext>
+            </a:extLst>
+          </p:cNvPr>
+          <p:cNvSpPr>
+            <a:spLocks noGrp="1" noRot="1" noChangeAspect="1" noMove="1" noResize="1" noEditPoints="1" noAdjustHandles="1" noChangeArrowheads="1" noChangeShapeType="1" noTextEdit="1"/>
+          </p:cNvSpPr>
+          <p:nvPr>
+            <p:extLst>
+              <p:ext uri="{386F3935-93C4-4BCD-93E2-E3B085C9AB24}">
+                <p16:designElem xmlns:p16="http://schemas.microsoft.com/office/powerpoint/2015/main" val="1"/>
+              </p:ext>
+            </p:extLst>
+          </p:nvPr>
+        </p:nvSpPr>
+        <p:spPr>
+          <a:xfrm rot="18900000" flipH="1">
+            <a:off x="891641" y="422146"/>
+            <a:ext cx="645368" cy="645368"/>
+          </a:xfrm>
+          <a:prstGeom prst="rect">
+            <a:avLst/>
+          </a:prstGeom>
+          <a:solidFill>
+            <a:schemeClr val="accent1">
+              <a:alpha val="30000"/>
+            </a:schemeClr>
+          </a:solidFill>
+          <a:ln>
+            <a:noFill/>
+          </a:ln>
+        </p:spPr>
+        <p:style>
+          <a:lnRef idx="2">
+            <a:schemeClr val="accent1">
+              <a:shade val="50000"/>
+            </a:schemeClr>
+          </a:lnRef>
+          <a:fillRef idx="1">
+            <a:schemeClr val="accent1"/>
+          </a:fillRef>
+          <a:effectRef idx="0">
+            <a:schemeClr val="accent1"/>
+          </a:effectRef>
+          <a:fontRef idx="minor">
+            <a:schemeClr val="lt1"/>
+          </a:fontRef>
+        </p:style>
+        <p:txBody>
+          <a:bodyPr rtlCol="0" anchor="ctr"/>
+          <a:lstStyle/>
+          <a:p>
+            <a:pPr algn="ctr"/>
+            <a:endParaRPr lang="en-US"/>
+          </a:p>
+        </p:txBody>
+      </p:sp>
+      <p:sp>
+        <p:nvSpPr>
+          <p:cNvPr id="16" name="Rectangle 15">
+            <a:extLst>
+              <a:ext uri="{FF2B5EF4-FFF2-40B4-BE49-F238E27FC236}">
+                <a16:creationId xmlns:a16="http://schemas.microsoft.com/office/drawing/2014/main" id="{3783CA14-24A1-485C-8B30-D6A5D87987AD}"/>
+              </a:ext>
+              <a:ext uri="{C183D7F6-B498-43B3-948B-1728B52AA6E4}">
+                <adec:decorative xmlns:adec="http://schemas.microsoft.com/office/drawing/2017/decorative" val="1"/>
+              </a:ext>
+            </a:extLst>
+          </p:cNvPr>
+          <p:cNvSpPr>
+            <a:spLocks noGrp="1" noRot="1" noChangeAspect="1" noMove="1" noResize="1" noEditPoints="1" noAdjustHandles="1" noChangeArrowheads="1" noChangeShapeType="1" noTextEdit="1"/>
+          </p:cNvSpPr>
+          <p:nvPr>
+            <p:extLst>
+              <p:ext uri="{386F3935-93C4-4BCD-93E2-E3B085C9AB24}">
+                <p16:designElem xmlns:p16="http://schemas.microsoft.com/office/powerpoint/2015/main" val="1"/>
+              </p:ext>
+            </p:extLst>
+          </p:nvPr>
+        </p:nvSpPr>
+        <p:spPr>
+          <a:xfrm rot="18900000" flipH="1">
+            <a:off x="10043482" y="655140"/>
+            <a:ext cx="687472" cy="687472"/>
+          </a:xfrm>
+          <a:prstGeom prst="rect">
+            <a:avLst/>
+          </a:prstGeom>
+          <a:solidFill>
+            <a:schemeClr val="accent4">
+              <a:alpha val="30000"/>
+            </a:schemeClr>
+          </a:solidFill>
+          <a:ln>
+            <a:noFill/>
+          </a:ln>
+        </p:spPr>
+        <p:style>
+          <a:lnRef idx="2">
+            <a:schemeClr val="accent1">
+              <a:shade val="50000"/>
+            </a:schemeClr>
+          </a:lnRef>
+          <a:fillRef idx="1">
+            <a:schemeClr val="accent1"/>
+          </a:fillRef>
+          <a:effectRef idx="0">
+            <a:schemeClr val="accent1"/>
+          </a:effectRef>
+          <a:fontRef idx="minor">
+            <a:schemeClr val="lt1"/>
+          </a:fontRef>
+        </p:style>
+        <p:txBody>
+          <a:bodyPr rtlCol="0" anchor="ctr"/>
+          <a:lstStyle/>
+          <a:p>
+            <a:pPr algn="ctr"/>
+            <a:endParaRPr lang="en-US"/>
+          </a:p>
+        </p:txBody>
+      </p:sp>
+      <p:sp>
+        <p:nvSpPr>
+          <p:cNvPr id="18" name="Freeform: Shape 17">
+            <a:extLst>
+              <a:ext uri="{FF2B5EF4-FFF2-40B4-BE49-F238E27FC236}">
+                <a16:creationId xmlns:a16="http://schemas.microsoft.com/office/drawing/2014/main" id="{9A97C86A-04D6-40F7-AE84-31AB43E6A846}"/>
+              </a:ext>
+              <a:ext uri="{C183D7F6-B498-43B3-948B-1728B52AA6E4}">
+                <adec:decorative xmlns:adec="http://schemas.microsoft.com/office/drawing/2017/decorative" val="1"/>
+              </a:ext>
+            </a:extLst>
+          </p:cNvPr>
+          <p:cNvSpPr>
+            <a:spLocks noGrp="1" noRot="1" noChangeAspect="1" noMove="1" noResize="1" noEditPoints="1" noAdjustHandles="1" noChangeArrowheads="1" noChangeShapeType="1" noTextEdit="1"/>
+          </p:cNvSpPr>
+          <p:nvPr>
+            <p:extLst>
+              <p:ext uri="{386F3935-93C4-4BCD-93E2-E3B085C9AB24}">
+                <p16:designElem xmlns:p16="http://schemas.microsoft.com/office/powerpoint/2015/main" val="1"/>
+              </p:ext>
+            </p:extLst>
+          </p:nvPr>
+        </p:nvSpPr>
+        <p:spPr>
+          <a:xfrm rot="10800000" flipH="1">
+            <a:off x="9356643" y="0"/>
+            <a:ext cx="2835357" cy="1480837"/>
+          </a:xfrm>
+          <a:custGeom>
+            <a:avLst/>
+            <a:gdLst>
+              <a:gd name="connsiteX0" fmla="*/ 2835357 w 2835357"/>
+              <a:gd name="connsiteY0" fmla="*/ 1480837 h 1480837"/>
+              <a:gd name="connsiteX1" fmla="*/ 0 w 2835357"/>
+              <a:gd name="connsiteY1" fmla="*/ 1480837 h 1480837"/>
+              <a:gd name="connsiteX2" fmla="*/ 1552727 w 2835357"/>
+              <a:gd name="connsiteY2" fmla="*/ 0 h 1480837"/>
+              <a:gd name="connsiteX3" fmla="*/ 2835357 w 2835357"/>
+              <a:gd name="connsiteY3" fmla="*/ 1223245 h 1480837"/>
+            </a:gdLst>
+            <a:ahLst/>
+            <a:cxnLst>
+              <a:cxn ang="0">
+                <a:pos x="connsiteX0" y="connsiteY0"/>
+              </a:cxn>
+              <a:cxn ang="0">
+                <a:pos x="connsiteX1" y="connsiteY1"/>
+              </a:cxn>
+              <a:cxn ang="0">
+                <a:pos x="connsiteX2" y="connsiteY2"/>
+              </a:cxn>
+              <a:cxn ang="0">
+                <a:pos x="connsiteX3" y="connsiteY3"/>
+              </a:cxn>
+            </a:cxnLst>
+            <a:rect l="l" t="t" r="r" b="b"/>
+            <a:pathLst>
+              <a:path w="2835357" h="1480837">
+                <a:moveTo>
+                  <a:pt x="2835357" y="1480837"/>
+                </a:moveTo>
+                <a:lnTo>
+                  <a:pt x="0" y="1480837"/>
+                </a:lnTo>
+                <a:lnTo>
+                  <a:pt x="1552727" y="0"/>
+                </a:lnTo>
+                <a:lnTo>
+                  <a:pt x="2835357" y="1223245"/>
+                </a:lnTo>
+                <a:close/>
+              </a:path>
+            </a:pathLst>
+          </a:custGeom>
+          <a:solidFill>
+            <a:schemeClr val="accent4">
+              <a:alpha val="30000"/>
+            </a:schemeClr>
+          </a:solidFill>
+          <a:ln>
+            <a:noFill/>
+          </a:ln>
+        </p:spPr>
+        <p:style>
+          <a:lnRef idx="2">
+            <a:schemeClr val="accent1">
+              <a:shade val="50000"/>
+            </a:schemeClr>
+          </a:lnRef>
+          <a:fillRef idx="1">
+            <a:schemeClr val="accent1"/>
+          </a:fillRef>
+          <a:effectRef idx="0">
+            <a:schemeClr val="accent1"/>
+          </a:effectRef>
+          <a:fontRef idx="minor">
+            <a:schemeClr val="lt1"/>
+          </a:fontRef>
+        </p:style>
+        <p:txBody>
+          <a:bodyPr wrap="square" rtlCol="0" anchor="ctr">
+            <a:noAutofit/>
+          </a:bodyPr>
+          <a:lstStyle/>
+          <a:p>
+            <a:pPr algn="ctr"/>
+            <a:endParaRPr lang="en-US" dirty="0"/>
+          </a:p>
+        </p:txBody>
+      </p:sp>
+      <p:sp>
+        <p:nvSpPr>
+          <p:cNvPr id="20" name="Isosceles Triangle 19">
+            <a:extLst>
+              <a:ext uri="{FF2B5EF4-FFF2-40B4-BE49-F238E27FC236}">
+                <a16:creationId xmlns:a16="http://schemas.microsoft.com/office/drawing/2014/main" id="{FF9F2414-84E8-453E-B1F3-389FDE8192D9}"/>
+              </a:ext>
+              <a:ext uri="{C183D7F6-B498-43B3-948B-1728B52AA6E4}">
+                <adec:decorative xmlns:adec="http://schemas.microsoft.com/office/drawing/2017/decorative" val="1"/>
+              </a:ext>
+            </a:extLst>
+          </p:cNvPr>
+          <p:cNvSpPr>
+            <a:spLocks noGrp="1" noRot="1" noChangeAspect="1" noMove="1" noResize="1" noEditPoints="1" noAdjustHandles="1" noChangeArrowheads="1" noChangeShapeType="1" noTextEdit="1"/>
+          </p:cNvSpPr>
+          <p:nvPr>
+            <p:extLst>
+              <p:ext uri="{386F3935-93C4-4BCD-93E2-E3B085C9AB24}">
+                <p16:designElem xmlns:p16="http://schemas.microsoft.com/office/powerpoint/2015/main" val="1"/>
+              </p:ext>
+            </p:extLst>
+          </p:nvPr>
+        </p:nvSpPr>
+        <p:spPr>
+          <a:xfrm flipH="1">
+            <a:off x="7976344" y="6115501"/>
+            <a:ext cx="1494513" cy="742499"/>
+          </a:xfrm>
+          <a:prstGeom prst="triangle">
+            <a:avLst/>
+          </a:prstGeom>
+          <a:solidFill>
+            <a:schemeClr val="accent1">
+              <a:alpha val="30000"/>
+            </a:schemeClr>
+          </a:solidFill>
+          <a:ln>
+            <a:noFill/>
+          </a:ln>
+        </p:spPr>
+        <p:style>
+          <a:lnRef idx="2">
+            <a:schemeClr val="accent1">
+              <a:shade val="50000"/>
+            </a:schemeClr>
+          </a:lnRef>
+          <a:fillRef idx="1">
+            <a:schemeClr val="accent1"/>
+          </a:fillRef>
+          <a:effectRef idx="0">
+            <a:schemeClr val="accent1"/>
+          </a:effectRef>
+          <a:fontRef idx="minor">
+            <a:schemeClr val="lt1"/>
+          </a:fontRef>
+        </p:style>
+        <p:txBody>
+          <a:bodyPr rtlCol="0" anchor="ctr"/>
+          <a:lstStyle/>
+          <a:p>
+            <a:pPr algn="ctr"/>
+            <a:endParaRPr lang="en-US"/>
+          </a:p>
+        </p:txBody>
+      </p:sp>
+      <p:pic>
+        <p:nvPicPr>
+          <p:cNvPr id="5" name="Picture 4" descr="Chart, shape&#10;&#10;Description automatically generated with medium confidence">
+            <a:extLst>
+              <a:ext uri="{FF2B5EF4-FFF2-40B4-BE49-F238E27FC236}">
+                <a16:creationId xmlns:a16="http://schemas.microsoft.com/office/drawing/2014/main" id="{F1163897-92F1-7E37-56FE-65A63E7F6F55}"/>
+              </a:ext>
+            </a:extLst>
+          </p:cNvPr>
+          <p:cNvPicPr>
+            <a:picLocks noChangeAspect="1"/>
+          </p:cNvPicPr>
+          <p:nvPr/>
+        </p:nvPicPr>
+        <p:blipFill>
+          <a:blip r:embed="rId2"/>
+          <a:stretch>
+            <a:fillRect/>
+          </a:stretch>
+        </p:blipFill>
+        <p:spPr>
+          <a:xfrm>
+            <a:off x="1670670" y="354982"/>
+            <a:ext cx="8286043" cy="6214533"/>
+          </a:xfrm>
+          <a:prstGeom prst="rect">
+            <a:avLst/>
+          </a:prstGeom>
+          <a:ln>
+            <a:noFill/>
+          </a:ln>
+        </p:spPr>
+      </p:pic>
+      <p:sp>
+        <p:nvSpPr>
+          <p:cNvPr id="22" name="Isosceles Triangle 21">
+            <a:extLst>
+              <a:ext uri="{FF2B5EF4-FFF2-40B4-BE49-F238E27FC236}">
+                <a16:creationId xmlns:a16="http://schemas.microsoft.com/office/drawing/2014/main" id="{3ECA69A1-7536-43AC-85EF-C7106179F5ED}"/>
+              </a:ext>
+              <a:ext uri="{C183D7F6-B498-43B3-948B-1728B52AA6E4}">
+                <adec:decorative xmlns:adec="http://schemas.microsoft.com/office/drawing/2017/decorative" val="1"/>
+              </a:ext>
+            </a:extLst>
+          </p:cNvPr>
+          <p:cNvSpPr>
+            <a:spLocks noGrp="1" noRot="1" noChangeAspect="1" noMove="1" noResize="1" noEditPoints="1" noAdjustHandles="1" noChangeArrowheads="1" noChangeShapeType="1" noTextEdit="1"/>
+          </p:cNvSpPr>
+          <p:nvPr>
+            <p:extLst>
+              <p:ext uri="{386F3935-93C4-4BCD-93E2-E3B085C9AB24}">
+                <p16:designElem xmlns:p16="http://schemas.microsoft.com/office/powerpoint/2015/main" val="1"/>
+              </p:ext>
+            </p:extLst>
+          </p:nvPr>
+        </p:nvSpPr>
+        <p:spPr>
+          <a:xfrm flipH="1">
+            <a:off x="7604080" y="6453143"/>
+            <a:ext cx="814903" cy="404857"/>
+          </a:xfrm>
+          <a:prstGeom prst="triangle">
+            <a:avLst/>
+          </a:prstGeom>
+          <a:solidFill>
+            <a:schemeClr val="accent1">
+              <a:alpha val="30000"/>
+            </a:schemeClr>
+          </a:solidFill>
+          <a:ln>
+            <a:noFill/>
+          </a:ln>
+        </p:spPr>
+        <p:style>
+          <a:lnRef idx="2">
+            <a:schemeClr val="accent1">
+              <a:shade val="50000"/>
+            </a:schemeClr>
+          </a:lnRef>
+          <a:fillRef idx="1">
+            <a:schemeClr val="accent1"/>
+          </a:fillRef>
+          <a:effectRef idx="0">
+            <a:schemeClr val="accent1"/>
+          </a:effectRef>
+          <a:fontRef idx="minor">
+            <a:schemeClr val="lt1"/>
+          </a:fontRef>
+        </p:style>
+        <p:txBody>
+          <a:bodyPr rtlCol="0" anchor="ctr"/>
+          <a:lstStyle/>
+          <a:p>
+            <a:pPr algn="ctr"/>
+            <a:endParaRPr lang="en-US"/>
+          </a:p>
+        </p:txBody>
+      </p:sp>
+      <p:pic>
+        <p:nvPicPr>
+          <p:cNvPr id="6" name="Picture 5">
+            <a:extLst>
+              <a:ext uri="{FF2B5EF4-FFF2-40B4-BE49-F238E27FC236}">
+                <a16:creationId xmlns:a16="http://schemas.microsoft.com/office/drawing/2014/main" id="{4871393E-04A5-2813-48B7-7F401C5FE222}"/>
+              </a:ext>
+            </a:extLst>
+          </p:cNvPr>
+          <p:cNvPicPr>
+            <a:picLocks noChangeAspect="1"/>
+          </p:cNvPicPr>
+          <p:nvPr/>
+        </p:nvPicPr>
+        <p:blipFill>
+          <a:blip r:embed="rId3"/>
+          <a:stretch>
+            <a:fillRect/>
+          </a:stretch>
+        </p:blipFill>
+        <p:spPr>
+          <a:xfrm>
+            <a:off x="997036" y="4427757"/>
+            <a:ext cx="5098963" cy="2208255"/>
+          </a:xfrm>
+          <a:prstGeom prst="rect">
+            <a:avLst/>
+          </a:prstGeom>
+        </p:spPr>
+      </p:pic>
+    </p:spTree>
+    <p:extLst>
+      <p:ext uri="{BB962C8B-B14F-4D97-AF65-F5344CB8AC3E}">
+        <p14:creationId xmlns:p14="http://schemas.microsoft.com/office/powerpoint/2010/main" val="2969301682"/>
+      </p:ext>
+    </p:extLst>
+  </p:cSld>
+  <p:clrMapOvr>
+    <a:masterClrMapping/>
+  </p:clrMapOvr>
+</p:sld>
+</file>
+
+<file path=ppt/slides/slide4.xml><?xml version="1.0" encoding="utf-8"?>
+<p:sld xmlns:a="http://schemas.openxmlformats.org/drawingml/2006/main" xmlns:r="http://schemas.openxmlformats.org/officeDocument/2006/relationships" xmlns:p="http://schemas.openxmlformats.org/presentationml/2006/main">
+  <p:cSld>
+    <p:bg>
+      <p:bgPr>
+        <a:solidFill>
+          <a:schemeClr val="bg1"/>
+        </a:solidFill>
+        <a:effectLst/>
+      </p:bgPr>
+    </p:bg>
+    <p:spTree>
+      <p:nvGrpSpPr>
+        <p:cNvPr id="1" name=""/>
+        <p:cNvGrpSpPr/>
+        <p:nvPr/>
+      </p:nvGrpSpPr>
+      <p:grpSpPr>
+        <a:xfrm>
+          <a:off x="0" y="0"/>
+          <a:ext cx="0" cy="0"/>
+          <a:chOff x="0" y="0"/>
+          <a:chExt cx="0" cy="0"/>
+        </a:xfrm>
+      </p:grpSpPr>
+      <p:sp useBgFill="1">
+        <p:nvSpPr>
+          <p:cNvPr id="27" name="Rectangle 24">
+            <a:extLst>
+              <a:ext uri="{FF2B5EF4-FFF2-40B4-BE49-F238E27FC236}">
+                <a16:creationId xmlns:a16="http://schemas.microsoft.com/office/drawing/2014/main" id="{E1A92768-C90D-4200-8975-84CC4D4BC944}"/>
+              </a:ext>
+              <a:ext uri="{C183D7F6-B498-43B3-948B-1728B52AA6E4}">
+                <adec:decorative xmlns:adec="http://schemas.microsoft.com/office/drawing/2017/decorative" val="1"/>
+              </a:ext>
+            </a:extLst>
+          </p:cNvPr>
+          <p:cNvSpPr>
+            <a:spLocks noGrp="1" noRot="1" noChangeAspect="1" noMove="1" noResize="1" noEditPoints="1" noAdjustHandles="1" noChangeArrowheads="1" noChangeShapeType="1" noTextEdit="1"/>
+          </p:cNvSpPr>
+          <p:nvPr>
+            <p:extLst>
+              <p:ext uri="{386F3935-93C4-4BCD-93E2-E3B085C9AB24}">
+                <p16:designElem xmlns:p16="http://schemas.microsoft.com/office/powerpoint/2015/main" val="1"/>
+              </p:ext>
+            </p:extLst>
+          </p:nvPr>
+        </p:nvSpPr>
+        <p:spPr>
+          <a:xfrm>
+            <a:off x="0" y="-1"/>
+            <a:ext cx="12188952" cy="6858000"/>
+          </a:xfrm>
+          <a:prstGeom prst="rect">
+            <a:avLst/>
+          </a:prstGeom>
+          <a:ln>
+            <a:noFill/>
+          </a:ln>
+        </p:spPr>
+        <p:style>
+          <a:lnRef idx="2">
+            <a:schemeClr val="accent1">
+              <a:shade val="50000"/>
+            </a:schemeClr>
+          </a:lnRef>
+          <a:fillRef idx="1">
+            <a:schemeClr val="accent1"/>
+          </a:fillRef>
+          <a:effectRef idx="0">
+            <a:schemeClr val="accent1"/>
+          </a:effectRef>
+          <a:fontRef idx="minor">
+            <a:schemeClr val="lt1"/>
+          </a:fontRef>
+        </p:style>
+        <p:txBody>
+          <a:bodyPr rtlCol="0" anchor="ctr"/>
+          <a:lstStyle/>
+          <a:p>
+            <a:pPr algn="ctr"/>
+            <a:endParaRPr lang="en-US"/>
+          </a:p>
+        </p:txBody>
+      </p:sp>
+      <p:pic>
+        <p:nvPicPr>
+          <p:cNvPr id="5" name="Content Placeholder 4" descr="A picture containing vector graphics&#10;&#10;Description automatically generated">
+            <a:extLst>
+              <a:ext uri="{FF2B5EF4-FFF2-40B4-BE49-F238E27FC236}">
+                <a16:creationId xmlns:a16="http://schemas.microsoft.com/office/drawing/2014/main" id="{7F1EC89E-5587-B5C8-3563-6FF435F3EF29}"/>
+              </a:ext>
+            </a:extLst>
+          </p:cNvPr>
+          <p:cNvPicPr>
+            <a:picLocks noGrp="1" noChangeAspect="1"/>
+          </p:cNvPicPr>
+          <p:nvPr>
+            <p:ph idx="1"/>
+          </p:nvPr>
+        </p:nvPicPr>
+        <p:blipFill rotWithShape="1">
+          <a:blip r:embed="rId2"/>
+          <a:srcRect t="8687" b="865"/>
+          <a:stretch/>
+        </p:blipFill>
+        <p:spPr>
+          <a:xfrm>
+            <a:off x="20" y="10"/>
+            <a:ext cx="4003019" cy="3388883"/>
+          </a:xfrm>
+          <a:prstGeom prst="rect">
+            <a:avLst/>
+          </a:prstGeom>
+        </p:spPr>
+      </p:pic>
+      <p:pic>
+        <p:nvPicPr>
+          <p:cNvPr id="15" name="Picture 14" descr="Chart, bubble chart&#10;&#10;Description automatically generated">
+            <a:extLst>
+              <a:ext uri="{FF2B5EF4-FFF2-40B4-BE49-F238E27FC236}">
+                <a16:creationId xmlns:a16="http://schemas.microsoft.com/office/drawing/2014/main" id="{6E8BE30F-07A5-286F-6C8C-46790BF9CEE3}"/>
+              </a:ext>
+            </a:extLst>
+          </p:cNvPr>
+          <p:cNvPicPr>
+            <a:picLocks noChangeAspect="1"/>
+          </p:cNvPicPr>
+          <p:nvPr/>
+        </p:nvPicPr>
+        <p:blipFill rotWithShape="1">
+          <a:blip r:embed="rId3"/>
+          <a:srcRect t="3116" r="-1" b="5862"/>
+          <a:stretch/>
+        </p:blipFill>
+        <p:spPr>
+          <a:xfrm>
+            <a:off x="4094479" y="10"/>
+            <a:ext cx="4014047" cy="3383270"/>
+          </a:xfrm>
+          <a:prstGeom prst="rect">
+            <a:avLst/>
+          </a:prstGeom>
+        </p:spPr>
+      </p:pic>
+      <p:pic>
+        <p:nvPicPr>
+          <p:cNvPr id="13" name="Picture 12" descr="Chart&#10;&#10;Description automatically generated with medium confidence">
+            <a:extLst>
+              <a:ext uri="{FF2B5EF4-FFF2-40B4-BE49-F238E27FC236}">
+                <a16:creationId xmlns:a16="http://schemas.microsoft.com/office/drawing/2014/main" id="{C4F18481-648B-F523-B390-D343BA02A22E}"/>
+              </a:ext>
+            </a:extLst>
+          </p:cNvPr>
+          <p:cNvPicPr>
+            <a:picLocks noChangeAspect="1"/>
+          </p:cNvPicPr>
+          <p:nvPr/>
+        </p:nvPicPr>
+        <p:blipFill rotWithShape="1">
+          <a:blip r:embed="rId4"/>
+          <a:srcRect t="2853" r="-1" b="-1"/>
+          <a:stretch/>
+        </p:blipFill>
+        <p:spPr>
+          <a:xfrm>
+            <a:off x="8188960" y="10"/>
+            <a:ext cx="4003039" cy="3383270"/>
+          </a:xfrm>
+          <a:prstGeom prst="rect">
+            <a:avLst/>
+          </a:prstGeom>
+        </p:spPr>
+      </p:pic>
+      <p:pic>
+        <p:nvPicPr>
+          <p:cNvPr id="7" name="Picture 6" descr="Chart, bubble chart&#10;&#10;Description automatically generated">
+            <a:extLst>
+              <a:ext uri="{FF2B5EF4-FFF2-40B4-BE49-F238E27FC236}">
+                <a16:creationId xmlns:a16="http://schemas.microsoft.com/office/drawing/2014/main" id="{DD0B72A2-A9BA-E3BD-29F3-5C782C675E60}"/>
+              </a:ext>
+            </a:extLst>
+          </p:cNvPr>
+          <p:cNvPicPr>
+            <a:picLocks noChangeAspect="1"/>
+          </p:cNvPicPr>
+          <p:nvPr/>
+        </p:nvPicPr>
+        <p:blipFill rotWithShape="1">
+          <a:blip r:embed="rId5"/>
+          <a:srcRect t="7174" b="2185"/>
+          <a:stretch/>
+        </p:blipFill>
+        <p:spPr>
+          <a:xfrm>
+            <a:off x="20" y="3469102"/>
+            <a:ext cx="4003019" cy="3388893"/>
+          </a:xfrm>
+          <a:prstGeom prst="rect">
+            <a:avLst/>
+          </a:prstGeom>
+        </p:spPr>
+      </p:pic>
+      <p:pic>
+        <p:nvPicPr>
+          <p:cNvPr id="11" name="Picture 10" descr="Chart, bubble chart&#10;&#10;Description automatically generated">
+            <a:extLst>
+              <a:ext uri="{FF2B5EF4-FFF2-40B4-BE49-F238E27FC236}">
+                <a16:creationId xmlns:a16="http://schemas.microsoft.com/office/drawing/2014/main" id="{5B68CA17-C927-7944-D9F7-B1AC485A30F9}"/>
+              </a:ext>
+            </a:extLst>
+          </p:cNvPr>
+          <p:cNvPicPr>
+            <a:picLocks noChangeAspect="1"/>
+          </p:cNvPicPr>
+          <p:nvPr/>
+        </p:nvPicPr>
+        <p:blipFill rotWithShape="1">
+          <a:blip r:embed="rId6"/>
+          <a:srcRect t="4051" r="-1" b="6756"/>
+          <a:stretch/>
+        </p:blipFill>
+        <p:spPr>
+          <a:xfrm>
+            <a:off x="4094479" y="3469102"/>
+            <a:ext cx="4014047" cy="3383280"/>
+          </a:xfrm>
+          <a:prstGeom prst="rect">
+            <a:avLst/>
+          </a:prstGeom>
+        </p:spPr>
+      </p:pic>
+      <p:pic>
+        <p:nvPicPr>
+          <p:cNvPr id="9" name="Picture 8" descr="Chart, bubble chart&#10;&#10;Description automatically generated">
+            <a:extLst>
+              <a:ext uri="{FF2B5EF4-FFF2-40B4-BE49-F238E27FC236}">
+                <a16:creationId xmlns:a16="http://schemas.microsoft.com/office/drawing/2014/main" id="{254E2EE2-1C17-2219-B886-6D91D607DD84}"/>
+              </a:ext>
+            </a:extLst>
+          </p:cNvPr>
+          <p:cNvPicPr>
+            <a:picLocks noChangeAspect="1"/>
+          </p:cNvPicPr>
+          <p:nvPr/>
+        </p:nvPicPr>
+        <p:blipFill rotWithShape="1">
+          <a:blip r:embed="rId7"/>
+          <a:srcRect t="11979" r="-1" b="2958"/>
+          <a:stretch/>
+        </p:blipFill>
+        <p:spPr>
+          <a:xfrm>
+            <a:off x="8199966" y="3469102"/>
+            <a:ext cx="3992034" cy="3388893"/>
+          </a:xfrm>
+          <a:prstGeom prst="rect">
+            <a:avLst/>
+          </a:prstGeom>
+        </p:spPr>
+      </p:pic>
+    </p:spTree>
+    <p:extLst>
+      <p:ext uri="{BB962C8B-B14F-4D97-AF65-F5344CB8AC3E}">
+        <p14:creationId xmlns:p14="http://schemas.microsoft.com/office/powerpoint/2010/main" val="3173408243"/>
       </p:ext>
     </p:extLst>
   </p:cSld>

</xml_diff>